<commit_message>
added microservices training materials
</commit_message>
<xml_diff>
--- a/2. Spring 5.0/Day 12/Slides/7. Overview of JPA and Creating Your First Entity/overview-of-jpa-and-creating-your-first-entity-slides.pptx
+++ b/2. Spring 5.0/Day 12/Slides/7. Overview of JPA and Creating Your First Entity/overview-of-jpa-and-creating-your-first-entity-slides.pptx
@@ -3087,6 +3087,13 @@
               <a:t>Schema </a:t>
             </a:r>
             <a:r>
+              <a:rPr lang="en-US" sz="3950" spc="-20" dirty="0">
+                <a:latin typeface="Verdana" panose="020B0604030504040204"/>
+                <a:cs typeface="Verdana" panose="020B0604030504040204"/>
+              </a:rPr>
+              <a:t> </a:t>
+            </a:r>
+            <a:r>
               <a:rPr sz="3950" spc="-1375" dirty="0">
                 <a:latin typeface="Verdana" panose="020B0604030504040204"/>
                 <a:cs typeface="Verdana" panose="020B0604030504040204"/>
@@ -3094,11 +3101,11 @@
               <a:t> </a:t>
             </a:r>
             <a:r>
-              <a:rPr sz="3950" dirty="0">
-                <a:latin typeface="Verdana" panose="020B0604030504040204"/>
-                <a:cs typeface="Verdana" panose="020B0604030504040204"/>
-              </a:rPr>
-              <a:t>pgAdmin 4</a:t>
+              <a:rPr lang="en-US" sz="3950" dirty="0">
+                <a:latin typeface="Verdana" panose="020B0604030504040204"/>
+                <a:cs typeface="Verdana" panose="020B0604030504040204"/>
+              </a:rPr>
+              <a:t>MySQL  Workbench</a:t>
             </a:r>
             <a:endParaRPr sz="3950" dirty="0">
               <a:latin typeface="Verdana" panose="020B0604030504040204"/>

</xml_diff>